<commit_message>
Tutorial 17-unit-tests step 1
</commit_message>
<xml_diff>
--- a/doc/images/unittest-class-structure.pptx
+++ b/doc/images/unittest-class-structure.pptx
@@ -289,7 +289,7 @@
             <a:fld id="{EFDD9419-A8AE-4FAD-8E98-7AA1110A699D}" type="datetimeFigureOut">
               <a:rPr lang="en-US" smtClean="0"/>
               <a:pPr/>
-              <a:t>2/16/2024</a:t>
+              <a:t>2/18/2024</a:t>
             </a:fld>
             <a:endParaRPr lang="en-US"/>
           </a:p>
@@ -456,7 +456,7 @@
             <a:fld id="{EFDD9419-A8AE-4FAD-8E98-7AA1110A699D}" type="datetimeFigureOut">
               <a:rPr lang="en-US" smtClean="0"/>
               <a:pPr/>
-              <a:t>2/16/2024</a:t>
+              <a:t>2/18/2024</a:t>
             </a:fld>
             <a:endParaRPr lang="en-US"/>
           </a:p>
@@ -633,7 +633,7 @@
             <a:fld id="{EFDD9419-A8AE-4FAD-8E98-7AA1110A699D}" type="datetimeFigureOut">
               <a:rPr lang="en-US" smtClean="0"/>
               <a:pPr/>
-              <a:t>2/16/2024</a:t>
+              <a:t>2/18/2024</a:t>
             </a:fld>
             <a:endParaRPr lang="en-US"/>
           </a:p>
@@ -800,7 +800,7 @@
             <a:fld id="{EFDD9419-A8AE-4FAD-8E98-7AA1110A699D}" type="datetimeFigureOut">
               <a:rPr lang="en-US" smtClean="0"/>
               <a:pPr/>
-              <a:t>2/16/2024</a:t>
+              <a:t>2/18/2024</a:t>
             </a:fld>
             <a:endParaRPr lang="en-US"/>
           </a:p>
@@ -1043,7 +1043,7 @@
             <a:fld id="{EFDD9419-A8AE-4FAD-8E98-7AA1110A699D}" type="datetimeFigureOut">
               <a:rPr lang="en-US" smtClean="0"/>
               <a:pPr/>
-              <a:t>2/16/2024</a:t>
+              <a:t>2/18/2024</a:t>
             </a:fld>
             <a:endParaRPr lang="en-US"/>
           </a:p>
@@ -1328,7 +1328,7 @@
             <a:fld id="{EFDD9419-A8AE-4FAD-8E98-7AA1110A699D}" type="datetimeFigureOut">
               <a:rPr lang="en-US" smtClean="0"/>
               <a:pPr/>
-              <a:t>2/16/2024</a:t>
+              <a:t>2/18/2024</a:t>
             </a:fld>
             <a:endParaRPr lang="en-US"/>
           </a:p>
@@ -1747,7 +1747,7 @@
             <a:fld id="{EFDD9419-A8AE-4FAD-8E98-7AA1110A699D}" type="datetimeFigureOut">
               <a:rPr lang="en-US" smtClean="0"/>
               <a:pPr/>
-              <a:t>2/16/2024</a:t>
+              <a:t>2/18/2024</a:t>
             </a:fld>
             <a:endParaRPr lang="en-US"/>
           </a:p>
@@ -1862,7 +1862,7 @@
             <a:fld id="{EFDD9419-A8AE-4FAD-8E98-7AA1110A699D}" type="datetimeFigureOut">
               <a:rPr lang="en-US" smtClean="0"/>
               <a:pPr/>
-              <a:t>2/16/2024</a:t>
+              <a:t>2/18/2024</a:t>
             </a:fld>
             <a:endParaRPr lang="en-US"/>
           </a:p>
@@ -1954,7 +1954,7 @@
             <a:fld id="{EFDD9419-A8AE-4FAD-8E98-7AA1110A699D}" type="datetimeFigureOut">
               <a:rPr lang="en-US" smtClean="0"/>
               <a:pPr/>
-              <a:t>2/16/2024</a:t>
+              <a:t>2/18/2024</a:t>
             </a:fld>
             <a:endParaRPr lang="en-US"/>
           </a:p>
@@ -2228,7 +2228,7 @@
             <a:fld id="{EFDD9419-A8AE-4FAD-8E98-7AA1110A699D}" type="datetimeFigureOut">
               <a:rPr lang="en-US" smtClean="0"/>
               <a:pPr/>
-              <a:t>2/16/2024</a:t>
+              <a:t>2/18/2024</a:t>
             </a:fld>
             <a:endParaRPr lang="en-US"/>
           </a:p>
@@ -2478,7 +2478,7 @@
             <a:fld id="{EFDD9419-A8AE-4FAD-8E98-7AA1110A699D}" type="datetimeFigureOut">
               <a:rPr lang="en-US" smtClean="0"/>
               <a:pPr/>
-              <a:t>2/16/2024</a:t>
+              <a:t>2/18/2024</a:t>
             </a:fld>
             <a:endParaRPr lang="en-US"/>
           </a:p>
@@ -2688,7 +2688,7 @@
             <a:fld id="{EFDD9419-A8AE-4FAD-8E98-7AA1110A699D}" type="datetimeFigureOut">
               <a:rPr lang="en-US" smtClean="0"/>
               <a:pPr/>
-              <a:t>2/16/2024</a:t>
+              <a:t>2/18/2024</a:t>
             </a:fld>
             <a:endParaRPr lang="en-US"/>
           </a:p>
@@ -3219,7 +3219,7 @@
                   <a:schemeClr val="tx1"/>
                 </a:solidFill>
               </a:rPr>
-              <a:t>TestSuite</a:t>
+              <a:t>TestSuiteInfo</a:t>
             </a:r>
             <a:endParaRPr lang="en-US" dirty="0">
               <a:solidFill>
@@ -3485,7 +3485,7 @@
                   <a:schemeClr val="tx1"/>
                 </a:solidFill>
               </a:rPr>
-              <a:t>TestFixture</a:t>
+              <a:t>TestFixtureInfo</a:t>
             </a:r>
             <a:endParaRPr lang="en-US" dirty="0">
               <a:solidFill>
@@ -3788,12 +3788,12 @@
           <a:p>
             <a:pPr algn="ctr"/>
             <a:r>
-              <a:rPr lang="en-US" dirty="0" smtClean="0">
+              <a:rPr lang="en-US" dirty="0" err="1" smtClean="0">
                 <a:solidFill>
                   <a:schemeClr val="tx1"/>
                 </a:solidFill>
               </a:rPr>
-              <a:t>Test</a:t>
+              <a:t>TestBase</a:t>
             </a:r>
             <a:endParaRPr lang="en-US" dirty="0">
               <a:solidFill>

</xml_diff>

<commit_message>
Tutorial 17-unit-test-infrastructure redo Step 1-3
</commit_message>
<xml_diff>
--- a/doc/images/unittest-class-structure.pptx
+++ b/doc/images/unittest-class-structure.pptx
@@ -289,7 +289,7 @@
             <a:fld id="{EFDD9419-A8AE-4FAD-8E98-7AA1110A699D}" type="datetimeFigureOut">
               <a:rPr lang="en-US" smtClean="0"/>
               <a:pPr/>
-              <a:t>2/18/2024</a:t>
+              <a:t>3/9/2024</a:t>
             </a:fld>
             <a:endParaRPr lang="en-US"/>
           </a:p>
@@ -456,7 +456,7 @@
             <a:fld id="{EFDD9419-A8AE-4FAD-8E98-7AA1110A699D}" type="datetimeFigureOut">
               <a:rPr lang="en-US" smtClean="0"/>
               <a:pPr/>
-              <a:t>2/18/2024</a:t>
+              <a:t>3/9/2024</a:t>
             </a:fld>
             <a:endParaRPr lang="en-US"/>
           </a:p>
@@ -633,7 +633,7 @@
             <a:fld id="{EFDD9419-A8AE-4FAD-8E98-7AA1110A699D}" type="datetimeFigureOut">
               <a:rPr lang="en-US" smtClean="0"/>
               <a:pPr/>
-              <a:t>2/18/2024</a:t>
+              <a:t>3/9/2024</a:t>
             </a:fld>
             <a:endParaRPr lang="en-US"/>
           </a:p>
@@ -800,7 +800,7 @@
             <a:fld id="{EFDD9419-A8AE-4FAD-8E98-7AA1110A699D}" type="datetimeFigureOut">
               <a:rPr lang="en-US" smtClean="0"/>
               <a:pPr/>
-              <a:t>2/18/2024</a:t>
+              <a:t>3/9/2024</a:t>
             </a:fld>
             <a:endParaRPr lang="en-US"/>
           </a:p>
@@ -1043,7 +1043,7 @@
             <a:fld id="{EFDD9419-A8AE-4FAD-8E98-7AA1110A699D}" type="datetimeFigureOut">
               <a:rPr lang="en-US" smtClean="0"/>
               <a:pPr/>
-              <a:t>2/18/2024</a:t>
+              <a:t>3/9/2024</a:t>
             </a:fld>
             <a:endParaRPr lang="en-US"/>
           </a:p>
@@ -1328,7 +1328,7 @@
             <a:fld id="{EFDD9419-A8AE-4FAD-8E98-7AA1110A699D}" type="datetimeFigureOut">
               <a:rPr lang="en-US" smtClean="0"/>
               <a:pPr/>
-              <a:t>2/18/2024</a:t>
+              <a:t>3/9/2024</a:t>
             </a:fld>
             <a:endParaRPr lang="en-US"/>
           </a:p>
@@ -1747,7 +1747,7 @@
             <a:fld id="{EFDD9419-A8AE-4FAD-8E98-7AA1110A699D}" type="datetimeFigureOut">
               <a:rPr lang="en-US" smtClean="0"/>
               <a:pPr/>
-              <a:t>2/18/2024</a:t>
+              <a:t>3/9/2024</a:t>
             </a:fld>
             <a:endParaRPr lang="en-US"/>
           </a:p>
@@ -1862,7 +1862,7 @@
             <a:fld id="{EFDD9419-A8AE-4FAD-8E98-7AA1110A699D}" type="datetimeFigureOut">
               <a:rPr lang="en-US" smtClean="0"/>
               <a:pPr/>
-              <a:t>2/18/2024</a:t>
+              <a:t>3/9/2024</a:t>
             </a:fld>
             <a:endParaRPr lang="en-US"/>
           </a:p>
@@ -1954,7 +1954,7 @@
             <a:fld id="{EFDD9419-A8AE-4FAD-8E98-7AA1110A699D}" type="datetimeFigureOut">
               <a:rPr lang="en-US" smtClean="0"/>
               <a:pPr/>
-              <a:t>2/18/2024</a:t>
+              <a:t>3/9/2024</a:t>
             </a:fld>
             <a:endParaRPr lang="en-US"/>
           </a:p>
@@ -2228,7 +2228,7 @@
             <a:fld id="{EFDD9419-A8AE-4FAD-8E98-7AA1110A699D}" type="datetimeFigureOut">
               <a:rPr lang="en-US" smtClean="0"/>
               <a:pPr/>
-              <a:t>2/18/2024</a:t>
+              <a:t>3/9/2024</a:t>
             </a:fld>
             <a:endParaRPr lang="en-US"/>
           </a:p>
@@ -2478,7 +2478,7 @@
             <a:fld id="{EFDD9419-A8AE-4FAD-8E98-7AA1110A699D}" type="datetimeFigureOut">
               <a:rPr lang="en-US" smtClean="0"/>
               <a:pPr/>
-              <a:t>2/18/2024</a:t>
+              <a:t>3/9/2024</a:t>
             </a:fld>
             <a:endParaRPr lang="en-US"/>
           </a:p>
@@ -2688,7 +2688,7 @@
             <a:fld id="{EFDD9419-A8AE-4FAD-8E98-7AA1110A699D}" type="datetimeFigureOut">
               <a:rPr lang="en-US" smtClean="0"/>
               <a:pPr/>
-              <a:t>2/18/2024</a:t>
+              <a:t>3/9/2024</a:t>
             </a:fld>
             <a:endParaRPr lang="en-US"/>
           </a:p>
@@ -3067,8 +3067,8 @@
         </p:nvSpPr>
         <p:spPr>
           <a:xfrm>
-            <a:off x="2214546" y="500042"/>
-            <a:ext cx="1571636" cy="1214446"/>
+            <a:off x="2001026" y="500042"/>
+            <a:ext cx="1428760" cy="1214446"/>
           </a:xfrm>
           <a:prstGeom prst="rect">
             <a:avLst/>
@@ -3171,8 +3171,8 @@
         </p:nvSpPr>
         <p:spPr>
           <a:xfrm>
-            <a:off x="2214546" y="71414"/>
-            <a:ext cx="1571636" cy="428628"/>
+            <a:off x="2001026" y="71414"/>
+            <a:ext cx="1428760" cy="428628"/>
           </a:xfrm>
           <a:prstGeom prst="rect">
             <a:avLst/>
@@ -3214,14 +3214,14 @@
           <a:p>
             <a:pPr algn="ctr"/>
             <a:r>
-              <a:rPr lang="en-US" dirty="0" err="1" smtClean="0">
+              <a:rPr lang="en-US" sz="1600" dirty="0" err="1" smtClean="0">
                 <a:solidFill>
                   <a:schemeClr val="tx1"/>
                 </a:solidFill>
               </a:rPr>
               <a:t>TestSuiteInfo</a:t>
             </a:r>
-            <a:endParaRPr lang="en-US" dirty="0">
+            <a:endParaRPr lang="en-US" sz="1600" dirty="0">
               <a:solidFill>
                 <a:schemeClr val="tx1"/>
               </a:solidFill>
@@ -3239,8 +3239,8 @@
         </p:nvCxnSpPr>
         <p:spPr>
           <a:xfrm>
-            <a:off x="2000232" y="285728"/>
-            <a:ext cx="214314" cy="1588"/>
+            <a:off x="1858150" y="285728"/>
+            <a:ext cx="142876" cy="1588"/>
           </a:xfrm>
           <a:prstGeom prst="straightConnector1">
             <a:avLst/>
@@ -3273,8 +3273,8 @@
         </p:nvCxnSpPr>
         <p:spPr>
           <a:xfrm rot="5400000">
-            <a:off x="1820843" y="464323"/>
-            <a:ext cx="357984" cy="794"/>
+            <a:off x="1679555" y="464323"/>
+            <a:ext cx="357190" cy="1588"/>
           </a:xfrm>
           <a:prstGeom prst="line">
             <a:avLst/>
@@ -3303,8 +3303,8 @@
         </p:nvCxnSpPr>
         <p:spPr>
           <a:xfrm>
-            <a:off x="2000232" y="642918"/>
-            <a:ext cx="214314" cy="1588"/>
+            <a:off x="1858150" y="642918"/>
+            <a:ext cx="142876" cy="1588"/>
           </a:xfrm>
           <a:prstGeom prst="line">
             <a:avLst/>
@@ -3333,8 +3333,8 @@
         </p:nvSpPr>
         <p:spPr>
           <a:xfrm>
-            <a:off x="4143372" y="500042"/>
-            <a:ext cx="1571636" cy="1214446"/>
+            <a:off x="3715538" y="500042"/>
+            <a:ext cx="1427966" cy="1214446"/>
           </a:xfrm>
           <a:prstGeom prst="rect">
             <a:avLst/>
@@ -3437,8 +3437,8 @@
         </p:nvSpPr>
         <p:spPr>
           <a:xfrm>
-            <a:off x="4143372" y="71414"/>
-            <a:ext cx="1571636" cy="428628"/>
+            <a:off x="3715538" y="71414"/>
+            <a:ext cx="1427966" cy="428628"/>
           </a:xfrm>
           <a:prstGeom prst="rect">
             <a:avLst/>
@@ -3480,14 +3480,14 @@
           <a:p>
             <a:pPr algn="ctr"/>
             <a:r>
-              <a:rPr lang="en-US" dirty="0" err="1" smtClean="0">
+              <a:rPr lang="en-US" sz="1600" dirty="0" err="1" smtClean="0">
                 <a:solidFill>
                   <a:schemeClr val="tx1"/>
                 </a:solidFill>
               </a:rPr>
               <a:t>TestFixtureInfo</a:t>
             </a:r>
-            <a:endParaRPr lang="en-US" dirty="0">
+            <a:endParaRPr lang="en-US" sz="1600" dirty="0">
               <a:solidFill>
                 <a:schemeClr val="tx1"/>
               </a:solidFill>
@@ -3505,8 +3505,8 @@
         </p:nvCxnSpPr>
         <p:spPr>
           <a:xfrm>
-            <a:off x="3929058" y="285728"/>
-            <a:ext cx="214314" cy="1588"/>
+            <a:off x="3571868" y="285728"/>
+            <a:ext cx="143670" cy="1588"/>
           </a:xfrm>
           <a:prstGeom prst="straightConnector1">
             <a:avLst/>
@@ -3539,7 +3539,7 @@
         </p:nvCxnSpPr>
         <p:spPr>
           <a:xfrm rot="5400000">
-            <a:off x="3749669" y="464323"/>
+            <a:off x="3393273" y="464323"/>
             <a:ext cx="357984" cy="794"/>
           </a:xfrm>
           <a:prstGeom prst="line">
@@ -3569,8 +3569,8 @@
         </p:nvCxnSpPr>
         <p:spPr>
           <a:xfrm>
-            <a:off x="3929058" y="642918"/>
-            <a:ext cx="214314" cy="1588"/>
+            <a:off x="3571868" y="642918"/>
+            <a:ext cx="143670" cy="1588"/>
           </a:xfrm>
           <a:prstGeom prst="line">
             <a:avLst/>
@@ -3601,8 +3601,8 @@
         </p:nvCxnSpPr>
         <p:spPr>
           <a:xfrm>
-            <a:off x="2928926" y="857232"/>
-            <a:ext cx="1214446" cy="250033"/>
+            <a:off x="2714612" y="857232"/>
+            <a:ext cx="1000926" cy="250033"/>
           </a:xfrm>
           <a:prstGeom prst="straightConnector1">
             <a:avLst/>
@@ -3637,8 +3637,8 @@
         </p:nvCxnSpPr>
         <p:spPr>
           <a:xfrm>
-            <a:off x="2786050" y="1071546"/>
-            <a:ext cx="1357322" cy="35719"/>
+            <a:off x="2571736" y="1071546"/>
+            <a:ext cx="1143802" cy="35719"/>
           </a:xfrm>
           <a:prstGeom prst="straightConnector1">
             <a:avLst/>
@@ -3671,8 +3671,8 @@
         </p:nvSpPr>
         <p:spPr>
           <a:xfrm>
-            <a:off x="6072198" y="500042"/>
-            <a:ext cx="1571636" cy="1214446"/>
+            <a:off x="5429256" y="500042"/>
+            <a:ext cx="1428760" cy="1214446"/>
           </a:xfrm>
           <a:prstGeom prst="rect">
             <a:avLst/>
@@ -3727,7 +3727,7 @@
                   <a:schemeClr val="tx1"/>
                 </a:solidFill>
               </a:rPr>
-              <a:t>m_details</a:t>
+              <a:t>m_testInstance</a:t>
             </a:r>
             <a:endParaRPr lang="en-US" sz="1400" dirty="0" smtClean="0">
               <a:solidFill>
@@ -3735,6 +3735,21 @@
               </a:solidFill>
             </a:endParaRPr>
           </a:p>
+          <a:p>
+            <a:r>
+              <a:rPr lang="en-US" sz="1400" dirty="0" err="1" smtClean="0">
+                <a:solidFill>
+                  <a:schemeClr val="tx1"/>
+                </a:solidFill>
+              </a:rPr>
+              <a:t>m_details</a:t>
+            </a:r>
+            <a:endParaRPr lang="en-US" sz="1400" dirty="0" smtClean="0">
+              <a:solidFill>
+                <a:schemeClr val="tx1"/>
+              </a:solidFill>
+            </a:endParaRPr>
+          </a:p>
         </p:txBody>
       </p:sp>
       <p:sp>
@@ -3745,8 +3760,8 @@
         </p:nvSpPr>
         <p:spPr>
           <a:xfrm>
-            <a:off x="6072198" y="71414"/>
-            <a:ext cx="1571636" cy="428628"/>
+            <a:off x="5429256" y="71414"/>
+            <a:ext cx="1428760" cy="428628"/>
           </a:xfrm>
           <a:prstGeom prst="rect">
             <a:avLst/>
@@ -3788,14 +3803,14 @@
           <a:p>
             <a:pPr algn="ctr"/>
             <a:r>
-              <a:rPr lang="en-US" dirty="0" err="1" smtClean="0">
+              <a:rPr lang="en-US" sz="1600" dirty="0" err="1" smtClean="0">
                 <a:solidFill>
                   <a:schemeClr val="tx1"/>
                 </a:solidFill>
               </a:rPr>
-              <a:t>TestBase</a:t>
-            </a:r>
-            <a:endParaRPr lang="en-US" dirty="0">
+              <a:t>TestInfo</a:t>
+            </a:r>
+            <a:endParaRPr lang="en-US" sz="1600" dirty="0">
               <a:solidFill>
                 <a:schemeClr val="tx1"/>
               </a:solidFill>
@@ -3813,8 +3828,8 @@
         </p:nvCxnSpPr>
         <p:spPr>
           <a:xfrm>
-            <a:off x="5857884" y="285728"/>
-            <a:ext cx="214314" cy="1588"/>
+            <a:off x="5286380" y="285728"/>
+            <a:ext cx="142876" cy="1588"/>
           </a:xfrm>
           <a:prstGeom prst="straightConnector1">
             <a:avLst/>
@@ -3847,7 +3862,7 @@
         </p:nvCxnSpPr>
         <p:spPr>
           <a:xfrm rot="5400000">
-            <a:off x="5678495" y="464323"/>
+            <a:off x="5107785" y="464323"/>
             <a:ext cx="357984" cy="794"/>
           </a:xfrm>
           <a:prstGeom prst="line">
@@ -3877,8 +3892,8 @@
         </p:nvCxnSpPr>
         <p:spPr>
           <a:xfrm>
-            <a:off x="5857884" y="642918"/>
-            <a:ext cx="214314" cy="1588"/>
+            <a:off x="5286380" y="642918"/>
+            <a:ext cx="142876" cy="1588"/>
           </a:xfrm>
           <a:prstGeom prst="line">
             <a:avLst/>
@@ -3908,7 +3923,7 @@
         <p:spPr>
           <a:xfrm>
             <a:off x="285720" y="500042"/>
-            <a:ext cx="1571636" cy="1214446"/>
+            <a:ext cx="1428760" cy="1214446"/>
           </a:xfrm>
           <a:prstGeom prst="rect">
             <a:avLst/>
@@ -3982,7 +3997,7 @@
         <p:spPr>
           <a:xfrm>
             <a:off x="285720" y="71414"/>
-            <a:ext cx="1571636" cy="428628"/>
+            <a:ext cx="1428760" cy="428628"/>
           </a:xfrm>
           <a:prstGeom prst="rect">
             <a:avLst/>
@@ -4024,14 +4039,14 @@
           <a:p>
             <a:pPr algn="ctr"/>
             <a:r>
-              <a:rPr lang="en-US" dirty="0" err="1" smtClean="0">
+              <a:rPr lang="en-US" sz="1600" dirty="0" err="1" smtClean="0">
                 <a:solidFill>
                   <a:schemeClr val="tx1"/>
                 </a:solidFill>
               </a:rPr>
               <a:t>TestRegistry</a:t>
             </a:r>
-            <a:endParaRPr lang="en-US" dirty="0">
+            <a:endParaRPr lang="en-US" sz="1600" dirty="0">
               <a:solidFill>
                 <a:schemeClr val="tx1"/>
               </a:solidFill>
@@ -4049,8 +4064,8 @@
         </p:nvCxnSpPr>
         <p:spPr>
           <a:xfrm>
-            <a:off x="1000100" y="642918"/>
-            <a:ext cx="1214446" cy="464347"/>
+            <a:off x="929456" y="642918"/>
+            <a:ext cx="1071570" cy="464347"/>
           </a:xfrm>
           <a:prstGeom prst="straightConnector1">
             <a:avLst/>
@@ -4085,8 +4100,8 @@
         </p:nvCxnSpPr>
         <p:spPr>
           <a:xfrm>
-            <a:off x="857224" y="857232"/>
-            <a:ext cx="1357322" cy="250033"/>
+            <a:off x="786580" y="857232"/>
+            <a:ext cx="1214446" cy="250033"/>
           </a:xfrm>
           <a:prstGeom prst="straightConnector1">
             <a:avLst/>
@@ -4121,8 +4136,8 @@
         </p:nvCxnSpPr>
         <p:spPr>
           <a:xfrm>
-            <a:off x="4857752" y="857232"/>
-            <a:ext cx="1214446" cy="250033"/>
+            <a:off x="4429124" y="857232"/>
+            <a:ext cx="1000132" cy="250033"/>
           </a:xfrm>
           <a:prstGeom prst="straightConnector1">
             <a:avLst/>
@@ -4157,8 +4172,8 @@
         </p:nvCxnSpPr>
         <p:spPr>
           <a:xfrm>
-            <a:off x="4714876" y="1071546"/>
-            <a:ext cx="1357322" cy="35719"/>
+            <a:off x="4286248" y="1071546"/>
+            <a:ext cx="1143008" cy="35719"/>
           </a:xfrm>
           <a:prstGeom prst="straightConnector1">
             <a:avLst/>
@@ -4191,7 +4206,7 @@
         </p:nvSpPr>
         <p:spPr>
           <a:xfrm>
-            <a:off x="6072198" y="2571744"/>
+            <a:off x="5357818" y="2428868"/>
             <a:ext cx="1571636" cy="1214446"/>
           </a:xfrm>
           <a:prstGeom prst="rect">
@@ -4310,7 +4325,7 @@
         </p:nvSpPr>
         <p:spPr>
           <a:xfrm>
-            <a:off x="6072198" y="2143116"/>
+            <a:off x="5357818" y="2000240"/>
             <a:ext cx="1571636" cy="428628"/>
           </a:xfrm>
           <a:prstGeom prst="rect">
@@ -4372,15 +4387,15 @@
         <p:nvCxnSpPr>
           <p:cNvPr id="127" name="Straight Connector 126"/>
           <p:cNvCxnSpPr>
-            <a:stCxn id="96" idx="2"/>
+            <a:stCxn id="128" idx="2"/>
             <a:endCxn id="125" idx="0"/>
           </p:cNvCxnSpPr>
           <p:nvPr/>
         </p:nvCxnSpPr>
         <p:spPr>
           <a:xfrm rot="5400000">
-            <a:off x="6643702" y="1928802"/>
-            <a:ext cx="428628" cy="1588"/>
+            <a:off x="6072198" y="1928802"/>
+            <a:ext cx="142876" cy="1588"/>
           </a:xfrm>
           <a:prstGeom prst="line">
             <a:avLst/>
@@ -4409,7 +4424,7 @@
         </p:nvSpPr>
         <p:spPr>
           <a:xfrm>
-            <a:off x="6786578" y="1714488"/>
+            <a:off x="6072198" y="1714488"/>
             <a:ext cx="142876" cy="142876"/>
           </a:xfrm>
           <a:prstGeom prst="diamond">
@@ -4581,8 +4596,8 @@
         </p:nvCxnSpPr>
         <p:spPr>
           <a:xfrm flipV="1">
-            <a:off x="1000100" y="3178967"/>
-            <a:ext cx="5072098" cy="1321603"/>
+            <a:off x="1000100" y="3036091"/>
+            <a:ext cx="4357718" cy="1464479"/>
           </a:xfrm>
           <a:prstGeom prst="straightConnector1">
             <a:avLst/>
@@ -4615,7 +4630,7 @@
         </p:nvSpPr>
         <p:spPr>
           <a:xfrm>
-            <a:off x="2214546" y="2500306"/>
+            <a:off x="2214546" y="2428868"/>
             <a:ext cx="1928826" cy="1214446"/>
           </a:xfrm>
           <a:prstGeom prst="rect">
@@ -4734,7 +4749,7 @@
         </p:nvSpPr>
         <p:spPr>
           <a:xfrm>
-            <a:off x="2214546" y="2071678"/>
+            <a:off x="2214546" y="2000240"/>
             <a:ext cx="1928826" cy="428628"/>
           </a:xfrm>
           <a:prstGeom prst="rect">
@@ -4801,9 +4816,9 @@
           <p:nvPr/>
         </p:nvCxnSpPr>
         <p:spPr>
-          <a:xfrm flipV="1">
-            <a:off x="1000100" y="3107529"/>
-            <a:ext cx="1214446" cy="1178728"/>
+          <a:xfrm rot="5400000" flipH="1" flipV="1">
+            <a:off x="982241" y="3053951"/>
+            <a:ext cx="1250165" cy="1214446"/>
           </a:xfrm>
           <a:prstGeom prst="straightConnector1">
             <a:avLst/>
@@ -4955,8 +4970,8 @@
         </p:nvCxnSpPr>
         <p:spPr>
           <a:xfrm>
-            <a:off x="3143240" y="2643182"/>
-            <a:ext cx="1928826" cy="1071570"/>
+            <a:off x="3214678" y="2571744"/>
+            <a:ext cx="1857388" cy="1143008"/>
           </a:xfrm>
           <a:prstGeom prst="straightConnector1">
             <a:avLst/>
@@ -4965,6 +4980,378 @@
             <a:headEnd type="none" w="med" len="med"/>
             <a:tailEnd type="triangle" w="med" len="med"/>
           </a:ln>
+        </p:spPr>
+        <p:style>
+          <a:lnRef idx="1">
+            <a:schemeClr val="accent1"/>
+          </a:lnRef>
+          <a:fillRef idx="0">
+            <a:schemeClr val="accent1"/>
+          </a:fillRef>
+          <a:effectRef idx="0">
+            <a:schemeClr val="accent1"/>
+          </a:effectRef>
+          <a:fontRef idx="minor">
+            <a:schemeClr val="tx1"/>
+          </a:fontRef>
+        </p:style>
+      </p:cxnSp>
+      <p:sp>
+        <p:nvSpPr>
+          <p:cNvPr id="40" name="Rectangle 39"/>
+          <p:cNvSpPr/>
+          <p:nvPr/>
+        </p:nvSpPr>
+        <p:spPr>
+          <a:xfrm>
+            <a:off x="7429520" y="500042"/>
+            <a:ext cx="1428760" cy="1214446"/>
+          </a:xfrm>
+          <a:prstGeom prst="rect">
+            <a:avLst/>
+          </a:prstGeom>
+          <a:noFill/>
+          <a:ln>
+            <a:solidFill>
+              <a:schemeClr val="bg1">
+                <a:lumMod val="75000"/>
+              </a:schemeClr>
+            </a:solidFill>
+          </a:ln>
+        </p:spPr>
+        <p:style>
+          <a:lnRef idx="2">
+            <a:schemeClr val="accent1">
+              <a:shade val="50000"/>
+            </a:schemeClr>
+          </a:lnRef>
+          <a:fillRef idx="1">
+            <a:schemeClr val="accent1"/>
+          </a:fillRef>
+          <a:effectRef idx="0">
+            <a:schemeClr val="accent1"/>
+          </a:effectRef>
+          <a:fontRef idx="minor">
+            <a:schemeClr val="lt1"/>
+          </a:fontRef>
+        </p:style>
+        <p:txBody>
+          <a:bodyPr rtlCol="0" anchor="t"/>
+          <a:lstStyle/>
+          <a:p>
+            <a:r>
+              <a:rPr lang="en-US" sz="1400" dirty="0" err="1" smtClean="0">
+                <a:solidFill>
+                  <a:schemeClr val="tx1"/>
+                </a:solidFill>
+              </a:rPr>
+              <a:t>RunImpl</a:t>
+            </a:r>
+            <a:r>
+              <a:rPr lang="en-US" sz="1400" dirty="0" smtClean="0">
+                <a:solidFill>
+                  <a:schemeClr val="tx1"/>
+                </a:solidFill>
+              </a:rPr>
+              <a:t>()</a:t>
+            </a:r>
+            <a:endParaRPr lang="en-US" sz="1400" dirty="0" smtClean="0">
+              <a:solidFill>
+                <a:schemeClr val="tx1"/>
+              </a:solidFill>
+            </a:endParaRPr>
+          </a:p>
+        </p:txBody>
+      </p:sp>
+      <p:sp>
+        <p:nvSpPr>
+          <p:cNvPr id="41" name="Rectangle 40"/>
+          <p:cNvSpPr/>
+          <p:nvPr/>
+        </p:nvSpPr>
+        <p:spPr>
+          <a:xfrm>
+            <a:off x="7429520" y="71414"/>
+            <a:ext cx="1428760" cy="428628"/>
+          </a:xfrm>
+          <a:prstGeom prst="rect">
+            <a:avLst/>
+          </a:prstGeom>
+          <a:solidFill>
+            <a:schemeClr val="accent2">
+              <a:lumMod val="20000"/>
+              <a:lumOff val="80000"/>
+            </a:schemeClr>
+          </a:solidFill>
+          <a:ln>
+            <a:solidFill>
+              <a:schemeClr val="accent2">
+                <a:lumMod val="40000"/>
+                <a:lumOff val="60000"/>
+              </a:schemeClr>
+            </a:solidFill>
+          </a:ln>
+        </p:spPr>
+        <p:style>
+          <a:lnRef idx="2">
+            <a:schemeClr val="accent1">
+              <a:shade val="50000"/>
+            </a:schemeClr>
+          </a:lnRef>
+          <a:fillRef idx="1">
+            <a:schemeClr val="accent1"/>
+          </a:fillRef>
+          <a:effectRef idx="0">
+            <a:schemeClr val="accent1"/>
+          </a:effectRef>
+          <a:fontRef idx="minor">
+            <a:schemeClr val="lt1"/>
+          </a:fontRef>
+        </p:style>
+        <p:txBody>
+          <a:bodyPr rtlCol="0" anchor="ctr"/>
+          <a:lstStyle/>
+          <a:p>
+            <a:pPr algn="ctr"/>
+            <a:r>
+              <a:rPr lang="en-US" sz="1600" dirty="0" smtClean="0">
+                <a:solidFill>
+                  <a:schemeClr val="tx1"/>
+                </a:solidFill>
+              </a:rPr>
+              <a:t>Test</a:t>
+            </a:r>
+            <a:endParaRPr lang="en-US" sz="1600" dirty="0">
+              <a:solidFill>
+                <a:schemeClr val="tx1"/>
+              </a:solidFill>
+            </a:endParaRPr>
+          </a:p>
+        </p:txBody>
+      </p:sp>
+      <p:cxnSp>
+        <p:nvCxnSpPr>
+          <p:cNvPr id="87" name="Straight Arrow Connector 86"/>
+          <p:cNvCxnSpPr>
+            <a:endCxn id="40" idx="1"/>
+          </p:cNvCxnSpPr>
+          <p:nvPr/>
+        </p:nvCxnSpPr>
+        <p:spPr>
+          <a:xfrm>
+            <a:off x="6643702" y="857232"/>
+            <a:ext cx="785818" cy="250033"/>
+          </a:xfrm>
+          <a:prstGeom prst="straightConnector1">
+            <a:avLst/>
+          </a:prstGeom>
+          <a:ln>
+            <a:headEnd type="none" w="med" len="med"/>
+            <a:tailEnd type="triangle" w="med" len="med"/>
+          </a:ln>
+        </p:spPr>
+        <p:style>
+          <a:lnRef idx="1">
+            <a:schemeClr val="accent1"/>
+          </a:lnRef>
+          <a:fillRef idx="0">
+            <a:schemeClr val="accent1"/>
+          </a:fillRef>
+          <a:effectRef idx="0">
+            <a:schemeClr val="accent1"/>
+          </a:effectRef>
+          <a:fontRef idx="minor">
+            <a:schemeClr val="tx1"/>
+          </a:fontRef>
+        </p:style>
+      </p:cxnSp>
+      <p:sp>
+        <p:nvSpPr>
+          <p:cNvPr id="93" name="Rectangle 92"/>
+          <p:cNvSpPr/>
+          <p:nvPr/>
+        </p:nvSpPr>
+        <p:spPr>
+          <a:xfrm>
+            <a:off x="7429520" y="2428868"/>
+            <a:ext cx="1428760" cy="1214446"/>
+          </a:xfrm>
+          <a:prstGeom prst="rect">
+            <a:avLst/>
+          </a:prstGeom>
+          <a:noFill/>
+          <a:ln>
+            <a:solidFill>
+              <a:schemeClr val="bg1">
+                <a:lumMod val="75000"/>
+              </a:schemeClr>
+            </a:solidFill>
+          </a:ln>
+        </p:spPr>
+        <p:style>
+          <a:lnRef idx="2">
+            <a:schemeClr val="accent1">
+              <a:shade val="50000"/>
+            </a:schemeClr>
+          </a:lnRef>
+          <a:fillRef idx="1">
+            <a:schemeClr val="accent1"/>
+          </a:fillRef>
+          <a:effectRef idx="0">
+            <a:schemeClr val="accent1"/>
+          </a:effectRef>
+          <a:fontRef idx="minor">
+            <a:schemeClr val="lt1"/>
+          </a:fontRef>
+        </p:style>
+        <p:txBody>
+          <a:bodyPr rtlCol="0" anchor="t"/>
+          <a:lstStyle/>
+          <a:p>
+            <a:r>
+              <a:rPr lang="en-US" sz="1400" dirty="0" err="1" smtClean="0">
+                <a:solidFill>
+                  <a:schemeClr val="tx1"/>
+                </a:solidFill>
+              </a:rPr>
+              <a:t>RunImpl</a:t>
+            </a:r>
+            <a:r>
+              <a:rPr lang="en-US" sz="1400" dirty="0" smtClean="0">
+                <a:solidFill>
+                  <a:schemeClr val="tx1"/>
+                </a:solidFill>
+              </a:rPr>
+              <a:t>()</a:t>
+            </a:r>
+            <a:endParaRPr lang="en-US" sz="1400" dirty="0" smtClean="0">
+              <a:solidFill>
+                <a:schemeClr val="tx1"/>
+              </a:solidFill>
+            </a:endParaRPr>
+          </a:p>
+        </p:txBody>
+      </p:sp>
+      <p:sp>
+        <p:nvSpPr>
+          <p:cNvPr id="94" name="Rectangle 93"/>
+          <p:cNvSpPr/>
+          <p:nvPr/>
+        </p:nvSpPr>
+        <p:spPr>
+          <a:xfrm>
+            <a:off x="7429520" y="2000240"/>
+            <a:ext cx="1428760" cy="428628"/>
+          </a:xfrm>
+          <a:prstGeom prst="rect">
+            <a:avLst/>
+          </a:prstGeom>
+          <a:solidFill>
+            <a:schemeClr val="accent2">
+              <a:lumMod val="20000"/>
+              <a:lumOff val="80000"/>
+            </a:schemeClr>
+          </a:solidFill>
+          <a:ln>
+            <a:solidFill>
+              <a:schemeClr val="accent2">
+                <a:lumMod val="40000"/>
+                <a:lumOff val="60000"/>
+              </a:schemeClr>
+            </a:solidFill>
+          </a:ln>
+        </p:spPr>
+        <p:style>
+          <a:lnRef idx="2">
+            <a:schemeClr val="accent1">
+              <a:shade val="50000"/>
+            </a:schemeClr>
+          </a:lnRef>
+          <a:fillRef idx="1">
+            <a:schemeClr val="accent1"/>
+          </a:fillRef>
+          <a:effectRef idx="0">
+            <a:schemeClr val="accent1"/>
+          </a:effectRef>
+          <a:fontRef idx="minor">
+            <a:schemeClr val="lt1"/>
+          </a:fontRef>
+        </p:style>
+        <p:txBody>
+          <a:bodyPr rtlCol="0" anchor="ctr"/>
+          <a:lstStyle/>
+          <a:p>
+            <a:pPr algn="ctr"/>
+            <a:r>
+              <a:rPr lang="en-US" sz="1600" dirty="0" err="1" smtClean="0">
+                <a:solidFill>
+                  <a:schemeClr val="tx1"/>
+                </a:solidFill>
+              </a:rPr>
+              <a:t>TestFixture</a:t>
+            </a:r>
+            <a:endParaRPr lang="en-US" sz="1600" dirty="0">
+              <a:solidFill>
+                <a:schemeClr val="tx1"/>
+              </a:solidFill>
+            </a:endParaRPr>
+          </a:p>
+        </p:txBody>
+      </p:sp>
+      <p:sp>
+        <p:nvSpPr>
+          <p:cNvPr id="95" name="Isosceles Triangle 94"/>
+          <p:cNvSpPr/>
+          <p:nvPr/>
+        </p:nvSpPr>
+        <p:spPr>
+          <a:xfrm>
+            <a:off x="8072462" y="1714488"/>
+            <a:ext cx="142876" cy="142876"/>
+          </a:xfrm>
+          <a:prstGeom prst="triangle">
+            <a:avLst/>
+          </a:prstGeom>
+        </p:spPr>
+        <p:style>
+          <a:lnRef idx="2">
+            <a:schemeClr val="accent1">
+              <a:shade val="50000"/>
+            </a:schemeClr>
+          </a:lnRef>
+          <a:fillRef idx="1">
+            <a:schemeClr val="accent1"/>
+          </a:fillRef>
+          <a:effectRef idx="0">
+            <a:schemeClr val="accent1"/>
+          </a:effectRef>
+          <a:fontRef idx="minor">
+            <a:schemeClr val="lt1"/>
+          </a:fontRef>
+        </p:style>
+        <p:txBody>
+          <a:bodyPr rtlCol="0" anchor="ctr"/>
+          <a:lstStyle/>
+          <a:p>
+            <a:pPr algn="ctr"/>
+            <a:endParaRPr lang="en-US"/>
+          </a:p>
+        </p:txBody>
+      </p:sp>
+      <p:cxnSp>
+        <p:nvCxnSpPr>
+          <p:cNvPr id="101" name="Straight Connector 100"/>
+          <p:cNvCxnSpPr/>
+          <p:nvPr/>
+        </p:nvCxnSpPr>
+        <p:spPr>
+          <a:xfrm rot="5400000">
+            <a:off x="8073256" y="1928008"/>
+            <a:ext cx="142876" cy="1588"/>
+          </a:xfrm>
+          <a:prstGeom prst="line">
+            <a:avLst/>
+          </a:prstGeom>
         </p:spPr>
         <p:style>
           <a:lnRef idx="1">

</xml_diff>